<commit_message>
lecture 5 nearly done
</commit_message>
<xml_diff>
--- a/Lecture4.pptx
+++ b/Lecture4.pptx
@@ -288,7 +288,7 @@
       <p15:sldGuideLst xmlns:p15="http://schemas.microsoft.com/office/powerpoint/2012/main"/>
     </p:ext>
     <p:ext uri="GoogleSlidesCustomDataVersion2">
-      <go:slidesCustomData xmlns="" xmlns:mc="http://schemas.openxmlformats.org/markup-compatibility/2006" xmlns:mv="urn:schemas-microsoft-com:mac:vml" xmlns:c="http://schemas.openxmlformats.org/drawingml/2006/chart" xmlns:dgm="http://schemas.openxmlformats.org/drawingml/2006/diagram" xmlns:o="urn:schemas-microsoft-com:office:office" xmlns:v="urn:schemas-microsoft-com:vml" xmlns:pvml="urn:schemas-microsoft-com:office:powerpoint" xmlns:com="http://schemas.openxmlformats.org/drawingml/2006/compatibility" xmlns:p14="http://schemas.microsoft.com/office/powerpoint/2010/main" xmlns:p15="http://schemas.microsoft.com/office/powerpoint/2012/main" xmlns:ahyp="http://schemas.microsoft.com/office/drawing/2018/hyperlinkcolor" xmlns:go="http://customooxmlschemas.google.com/" r:id="rId41" roundtripDataSignature="AMtx7mhEk3kr15p5MvOwX8Siehu9UxAE2A=="/>
+      <go:slidesCustomData xmlns:go="http://customooxmlschemas.google.com/" xmlns:ahyp="http://schemas.microsoft.com/office/drawing/2018/hyperlinkcolor" xmlns:p15="http://schemas.microsoft.com/office/powerpoint/2012/main" xmlns:p14="http://schemas.microsoft.com/office/powerpoint/2010/main" xmlns:com="http://schemas.openxmlformats.org/drawingml/2006/compatibility" xmlns:pvml="urn:schemas-microsoft-com:office:powerpoint" xmlns:v="urn:schemas-microsoft-com:vml" xmlns:o="urn:schemas-microsoft-com:office:office" xmlns:dgm="http://schemas.openxmlformats.org/drawingml/2006/diagram" xmlns:c="http://schemas.openxmlformats.org/drawingml/2006/chart" xmlns:mv="urn:schemas-microsoft-com:mac:vml" xmlns:mc="http://schemas.openxmlformats.org/markup-compatibility/2006" xmlns="" r:id="rId41" roundtripDataSignature="AMtx7mhEk3kr15p5MvOwX8Siehu9UxAE2A=="/>
     </p:ext>
   </p:extLst>
 </p:presentation>
@@ -2317,6 +2317,118 @@
     <p:extLst>
       <p:ext uri="{BB962C8B-B14F-4D97-AF65-F5344CB8AC3E}">
         <p14:creationId xmlns:p14="http://schemas.microsoft.com/office/powerpoint/2010/main" val="2676774349"/>
+      </p:ext>
+    </p:extLst>
+  </p:cSld>
+  <p:clrMapOvr>
+    <a:masterClrMapping/>
+  </p:clrMapOvr>
+</p:notes>
+</file>
+
+<file path=ppt/notesSlides/notesSlide9.xml><?xml version="1.0" encoding="utf-8"?>
+<p:notes xmlns:a="http://schemas.openxmlformats.org/drawingml/2006/main" xmlns:r="http://schemas.openxmlformats.org/officeDocument/2006/relationships" xmlns:p="http://schemas.openxmlformats.org/presentationml/2006/main">
+  <p:cSld>
+    <p:spTree>
+      <p:nvGrpSpPr>
+        <p:cNvPr id="1" name=""/>
+        <p:cNvGrpSpPr/>
+        <p:nvPr/>
+      </p:nvGrpSpPr>
+      <p:grpSpPr>
+        <a:xfrm>
+          <a:off x="0" y="0"/>
+          <a:ext cx="0" cy="0"/>
+          <a:chOff x="0" y="0"/>
+          <a:chExt cx="0" cy="0"/>
+        </a:xfrm>
+      </p:grpSpPr>
+      <p:sp>
+        <p:nvSpPr>
+          <p:cNvPr id="2" name="Slide Image Placeholder 1"/>
+          <p:cNvSpPr>
+            <a:spLocks noGrp="1" noRot="1" noChangeAspect="1"/>
+          </p:cNvSpPr>
+          <p:nvPr>
+            <p:ph type="sldImg"/>
+          </p:nvPr>
+        </p:nvSpPr>
+        <p:spPr/>
+      </p:sp>
+      <p:sp>
+        <p:nvSpPr>
+          <p:cNvPr id="3" name="Notes Placeholder 2"/>
+          <p:cNvSpPr>
+            <a:spLocks noGrp="1"/>
+          </p:cNvSpPr>
+          <p:nvPr>
+            <p:ph type="body" idx="1"/>
+          </p:nvPr>
+        </p:nvSpPr>
+        <p:spPr/>
+        <p:txBody>
+          <a:bodyPr/>
+          <a:lstStyle/>
+          <a:p>
+            <a:r>
+              <a:rPr lang="en-US" dirty="0"/>
+              <a:t>Biology First Results Sections!</a:t>
+            </a:r>
+          </a:p>
+        </p:txBody>
+      </p:sp>
+      <p:sp>
+        <p:nvSpPr>
+          <p:cNvPr id="4" name="Slide Number Placeholder 3"/>
+          <p:cNvSpPr>
+            <a:spLocks noGrp="1"/>
+          </p:cNvSpPr>
+          <p:nvPr>
+            <p:ph type="sldNum" idx="12"/>
+          </p:nvPr>
+        </p:nvSpPr>
+        <p:spPr/>
+        <p:txBody>
+          <a:bodyPr/>
+          <a:lstStyle/>
+          <a:p>
+            <a:pPr marL="0" marR="0" lvl="0" indent="0" algn="r" rtl="0">
+              <a:spcBef>
+                <a:spcPts val="0"/>
+              </a:spcBef>
+              <a:spcAft>
+                <a:spcPts val="0"/>
+              </a:spcAft>
+              <a:buNone/>
+            </a:pPr>
+            <a:fld id="{00000000-1234-1234-1234-123412341234}" type="slidenum">
+              <a:rPr lang="en-US" sz="1200" b="0" i="0" u="none" strike="noStrike" cap="none" smtClean="0">
+                <a:solidFill>
+                  <a:schemeClr val="dk1"/>
+                </a:solidFill>
+                <a:latin typeface="Calibri"/>
+                <a:ea typeface="Calibri"/>
+                <a:cs typeface="Calibri"/>
+                <a:sym typeface="Calibri"/>
+              </a:rPr>
+              <a:t>30</a:t>
+            </a:fld>
+            <a:endParaRPr lang="en-US" sz="1200" b="0" i="0" u="none" strike="noStrike" cap="none">
+              <a:solidFill>
+                <a:schemeClr val="dk1"/>
+              </a:solidFill>
+              <a:latin typeface="Calibri"/>
+              <a:ea typeface="Calibri"/>
+              <a:cs typeface="Calibri"/>
+              <a:sym typeface="Calibri"/>
+            </a:endParaRPr>
+          </a:p>
+        </p:txBody>
+      </p:sp>
+    </p:spTree>
+    <p:extLst>
+      <p:ext uri="{BB962C8B-B14F-4D97-AF65-F5344CB8AC3E}">
+        <p14:creationId xmlns:p14="http://schemas.microsoft.com/office/powerpoint/2010/main" val="4090383827"/>
       </p:ext>
     </p:extLst>
   </p:cSld>
@@ -22567,7 +22679,7 @@
           <a:p>
             <a:r>
               <a:rPr lang="en-US" dirty="0"/>
-              <a:t>Generally, a whole topic on it’s own, which we could talk about if anyone thinks they’re likely to use them!</a:t>
+              <a:t>Generally, a whole topic on its own, which we could talk about if anyone thinks they’re likely to use them!</a:t>
             </a:r>
           </a:p>
         </p:txBody>
@@ -22722,8 +22834,8 @@
         </p:nvSpPr>
         <p:spPr>
           <a:xfrm>
-            <a:off x="4735877" y="116732"/>
-            <a:ext cx="2483372" cy="523220"/>
+            <a:off x="3427829" y="116732"/>
+            <a:ext cx="5099473" cy="523220"/>
           </a:xfrm>
           <a:prstGeom prst="rect">
             <a:avLst/>
@@ -22739,7 +22851,7 @@
             <a:pPr algn="ctr"/>
             <a:r>
               <a:rPr lang="en-US" sz="2800" dirty="0"/>
-              <a:t>What goes in?</a:t>
+              <a:t>Writing Results: What goes in?</a:t>
             </a:r>
           </a:p>
         </p:txBody>
@@ -25230,7 +25342,7 @@
         <p:spPr>
           <a:xfrm>
             <a:off x="1943763" y="1328557"/>
-            <a:ext cx="8220075" cy="4016484"/>
+            <a:ext cx="8220075" cy="3708708"/>
           </a:xfrm>
           <a:prstGeom prst="rect">
             <a:avLst/>
@@ -25339,14 +25451,16 @@
             </a:r>
           </a:p>
           <a:p>
-            <a:pPr>
+            <a:pPr marL="171450" lvl="2" indent="-171450">
               <a:spcAft>
                 <a:spcPts val="600"/>
               </a:spcAft>
+              <a:buFont typeface="Arial" panose="020B0604020202020204" pitchFamily="34" charset="0"/>
+              <a:buChar char="•"/>
             </a:pPr>
             <a:r>
               <a:rPr lang="en-US" sz="2000" dirty="0"/>
-              <a:t>			Never write </a:t>
+              <a:t>Never write </a:t>
             </a:r>
             <a:r>
               <a:rPr lang="en-US" sz="2000" i="1" dirty="0"/>
@@ -25596,15 +25710,33 @@
                                   </p:childTnLst>
                                 </p:cTn>
                               </p:par>
+                            </p:childTnLst>
+                          </p:cTn>
+                        </p:par>
+                      </p:childTnLst>
+                    </p:cTn>
+                  </p:par>
+                  <p:par>
+                    <p:cTn id="17" fill="hold">
+                      <p:stCondLst>
+                        <p:cond delay="indefinite"/>
+                      </p:stCondLst>
+                      <p:childTnLst>
+                        <p:par>
+                          <p:cTn id="18" fill="hold">
+                            <p:stCondLst>
+                              <p:cond delay="0"/>
+                            </p:stCondLst>
+                            <p:childTnLst>
                               <p:par>
-                                <p:cTn id="17" presetID="1" presetClass="entr" presetSubtype="0" fill="hold" nodeType="withEffect">
+                                <p:cTn id="19" presetID="1" presetClass="entr" presetSubtype="0" fill="hold" nodeType="clickEffect">
                                   <p:stCondLst>
                                     <p:cond delay="0"/>
                                   </p:stCondLst>
                                   <p:childTnLst>
                                     <p:set>
                                       <p:cBhvr>
-                                        <p:cTn id="18" dur="1" fill="hold">
+                                        <p:cTn id="20" dur="1" fill="hold">
                                           <p:stCondLst>
                                             <p:cond delay="0"/>
                                           </p:stCondLst>

</xml_diff>